<commit_message>
finally a working version but links instead of iframes for presentations
</commit_message>
<xml_diff>
--- a/img/attributes_underestimation_pyramid.pptx
+++ b/img/attributes_underestimation_pyramid.pptx
@@ -209,7 +209,7 @@
           <a:p>
             <a:fld id="{0C5D2057-B97E-4F04-9E3B-8D5F77AA1E57}" type="datetimeFigureOut">
               <a:rPr lang="en-GB" smtClean="0"/>
-              <a:t>24/09/2024</a:t>
+              <a:t>25/09/2024</a:t>
             </a:fld>
             <a:endParaRPr lang="en-GB"/>
           </a:p>
@@ -2008,7 +2008,7 @@
         </p:nvSpPr>
         <p:spPr>
           <a:xfrm>
-            <a:off x="4778234" y="1341713"/>
+            <a:off x="4778234" y="1458449"/>
             <a:ext cx="1160341" cy="369332"/>
           </a:xfrm>
           <a:prstGeom prst="rect">
@@ -2895,52 +2895,7 @@
 
 <file path=customXml/item1.xml><?xml version="1.0" encoding="utf-8"?>
 <?mso-contentType ?>
-<spe:Receivers xmlns:spe="http://schemas.microsoft.com/sharepoint/events">
-  <Receiver>
-    <Name>Document ID Generator</Name>
-    <Synchronization>Synchronous</Synchronization>
-    <Type>10001</Type>
-    <SequenceNumber>1000</SequenceNumber>
-    <Url/>
-    <Assembly>Microsoft.Office.DocumentManagement, Version=16.0.0.0, Culture=neutral, PublicKeyToken=71e9bce111e9429c</Assembly>
-    <Class>Microsoft.Office.DocumentManagement.Internal.DocIdHandler</Class>
-    <Data/>
-    <Filter/>
-  </Receiver>
-  <Receiver>
-    <Name>Document ID Generator</Name>
-    <Synchronization>Synchronous</Synchronization>
-    <Type>10002</Type>
-    <SequenceNumber>1001</SequenceNumber>
-    <Url/>
-    <Assembly>Microsoft.Office.DocumentManagement, Version=16.0.0.0, Culture=neutral, PublicKeyToken=71e9bce111e9429c</Assembly>
-    <Class>Microsoft.Office.DocumentManagement.Internal.DocIdHandler</Class>
-    <Data/>
-    <Filter/>
-  </Receiver>
-  <Receiver>
-    <Name>Document ID Generator</Name>
-    <Synchronization>Synchronous</Synchronization>
-    <Type>10004</Type>
-    <SequenceNumber>1002</SequenceNumber>
-    <Url/>
-    <Assembly>Microsoft.Office.DocumentManagement, Version=16.0.0.0, Culture=neutral, PublicKeyToken=71e9bce111e9429c</Assembly>
-    <Class>Microsoft.Office.DocumentManagement.Internal.DocIdHandler</Class>
-    <Data/>
-    <Filter/>
-  </Receiver>
-  <Receiver>
-    <Name>Document ID Generator</Name>
-    <Synchronization>Synchronous</Synchronization>
-    <Type>10006</Type>
-    <SequenceNumber>1003</SequenceNumber>
-    <Url/>
-    <Assembly>Microsoft.Office.DocumentManagement, Version=16.0.0.0, Culture=neutral, PublicKeyToken=71e9bce111e9429c</Assembly>
-    <Class>Microsoft.Office.DocumentManagement.Internal.DocIdHandler</Class>
-    <Data/>
-    <Filter/>
-  </Receiver>
-</spe:Receivers>
+<SharedContentType xmlns="Microsoft.SharePoint.Taxonomy.ContentTypeSync" SourceId="14c281f0-fdb2-43d6-8bd5-8268950107ba" ContentTypeId="0x010100EE95EE7DB3A482488E68FA4A7091999F" PreviousValue="false" LastSyncTimeStamp="2023-05-23T07:48:25.837Z"/>
 </file>
 
 <file path=customXml/item2.xml><?xml version="1.0" encoding="utf-8"?>
@@ -3004,10 +2959,64 @@
 
 <file path=customXml/item3.xml><?xml version="1.0" encoding="utf-8"?>
 <?mso-contentType ?>
-<SharedContentType xmlns="Microsoft.SharePoint.Taxonomy.ContentTypeSync" SourceId="14c281f0-fdb2-43d6-8bd5-8268950107ba" ContentTypeId="0x010100EE95EE7DB3A482488E68FA4A7091999F" PreviousValue="false" LastSyncTimeStamp="2023-05-23T07:48:25.837Z"/>
+<spe:Receivers xmlns:spe="http://schemas.microsoft.com/sharepoint/events">
+  <Receiver>
+    <Name>Document ID Generator</Name>
+    <Synchronization>Synchronous</Synchronization>
+    <Type>10001</Type>
+    <SequenceNumber>1000</SequenceNumber>
+    <Url/>
+    <Assembly>Microsoft.Office.DocumentManagement, Version=16.0.0.0, Culture=neutral, PublicKeyToken=71e9bce111e9429c</Assembly>
+    <Class>Microsoft.Office.DocumentManagement.Internal.DocIdHandler</Class>
+    <Data/>
+    <Filter/>
+  </Receiver>
+  <Receiver>
+    <Name>Document ID Generator</Name>
+    <Synchronization>Synchronous</Synchronization>
+    <Type>10002</Type>
+    <SequenceNumber>1001</SequenceNumber>
+    <Url/>
+    <Assembly>Microsoft.Office.DocumentManagement, Version=16.0.0.0, Culture=neutral, PublicKeyToken=71e9bce111e9429c</Assembly>
+    <Class>Microsoft.Office.DocumentManagement.Internal.DocIdHandler</Class>
+    <Data/>
+    <Filter/>
+  </Receiver>
+  <Receiver>
+    <Name>Document ID Generator</Name>
+    <Synchronization>Synchronous</Synchronization>
+    <Type>10004</Type>
+    <SequenceNumber>1002</SequenceNumber>
+    <Url/>
+    <Assembly>Microsoft.Office.DocumentManagement, Version=16.0.0.0, Culture=neutral, PublicKeyToken=71e9bce111e9429c</Assembly>
+    <Class>Microsoft.Office.DocumentManagement.Internal.DocIdHandler</Class>
+    <Data/>
+    <Filter/>
+  </Receiver>
+  <Receiver>
+    <Name>Document ID Generator</Name>
+    <Synchronization>Synchronous</Synchronization>
+    <Type>10006</Type>
+    <SequenceNumber>1003</SequenceNumber>
+    <Url/>
+    <Assembly>Microsoft.Office.DocumentManagement, Version=16.0.0.0, Culture=neutral, PublicKeyToken=71e9bce111e9429c</Assembly>
+    <Class>Microsoft.Office.DocumentManagement.Internal.DocIdHandler</Class>
+    <Data/>
+    <Filter/>
+  </Receiver>
+</spe:Receivers>
 </file>
 
 <file path=customXml/item4.xml><?xml version="1.0" encoding="utf-8"?>
+<?mso-contentType ?>
+<FormTemplates xmlns="http://schemas.microsoft.com/sharepoint/v3/contenttype/forms">
+  <Display>DocumentLibraryForm</Display>
+  <Edit>DocumentLibraryForm</Edit>
+  <New>DocumentLibraryForm</New>
+</FormTemplates>
+</file>
+
+<file path=customXml/item5.xml><?xml version="1.0" encoding="utf-8"?>
 <ct:contentTypeSchema xmlns:ct="http://schemas.microsoft.com/office/2006/metadata/contentType" xmlns:ma="http://schemas.microsoft.com/office/2006/metadata/properties/metaAttributes" ct:_="" ma:_="" ma:contentTypeName="Standard Document" ma:contentTypeID="0x010100EE95EE7DB3A482488E68FA4A7091999F002BC2764FE2F4F441AAC91C4B396137B0" ma:contentTypeVersion="8" ma:contentTypeDescription="Create a new document." ma:contentTypeScope="" ma:versionID="019621ac357b7d42107431f61faad9c4">
   <xsd:schema xmlns:xsd="http://www.w3.org/2001/XMLSchema" xmlns:xs="http://www.w3.org/2001/XMLSchema" xmlns:p="http://schemas.microsoft.com/office/2006/metadata/properties" xmlns:ns2="4240f11c-4df2-4a37-9be1-bdf0d4dfc218" xmlns:ns3="fe73b3f6-a427-4a99-886e-da32c6de835d" xmlns:ns4="aa219290-eb03-4a97-b130-2294a785c327" targetNamespace="http://schemas.microsoft.com/office/2006/metadata/properties" ma:root="true" ma:fieldsID="bd8c0a9a9502bf7bc54e3ec45693c595" ns2:_="" ns3:_="" ns4:_="">
     <xsd:import namespace="4240f11c-4df2-4a37-9be1-bdf0d4dfc218"/>
@@ -3300,19 +3309,10 @@
 </ct:contentTypeSchema>
 </file>
 
-<file path=customXml/item5.xml><?xml version="1.0" encoding="utf-8"?>
-<?mso-contentType ?>
-<FormTemplates xmlns="http://schemas.microsoft.com/sharepoint/v3/contenttype/forms">
-  <Display>DocumentLibraryForm</Display>
-  <Edit>DocumentLibraryForm</Edit>
-  <New>DocumentLibraryForm</New>
-</FormTemplates>
-</file>
-
 <file path=customXml/itemProps1.xml><?xml version="1.0" encoding="utf-8"?>
-<ds:datastoreItem xmlns:ds="http://schemas.openxmlformats.org/officeDocument/2006/customXml" ds:itemID="{FD5C724A-FE52-47CB-B70E-6E5E629AB91F}">
+<ds:datastoreItem xmlns:ds="http://schemas.openxmlformats.org/officeDocument/2006/customXml" ds:itemID="{0E485EC4-498C-4950-880B-710CFB50DAA5}">
   <ds:schemaRefs>
-    <ds:schemaRef ds:uri="http://schemas.microsoft.com/sharepoint/events"/>
+    <ds:schemaRef ds:uri="Microsoft.SharePoint.Taxonomy.ContentTypeSync"/>
   </ds:schemaRefs>
 </ds:datastoreItem>
 </file>
@@ -3321,14 +3321,14 @@
 <ds:datastoreItem xmlns:ds="http://schemas.openxmlformats.org/officeDocument/2006/customXml" ds:itemID="{80FF93BA-ECA0-430B-BCB7-D8B1D2DB87E9}">
   <ds:schemaRefs>
     <ds:schemaRef ds:uri="http://schemas.microsoft.com/office/2006/documentManagement/types"/>
+    <ds:schemaRef ds:uri="4240f11c-4df2-4a37-9be1-bdf0d4dfc218"/>
+    <ds:schemaRef ds:uri="http://schemas.openxmlformats.org/package/2006/metadata/core-properties"/>
+    <ds:schemaRef ds:uri="aa219290-eb03-4a97-b130-2294a785c327"/>
     <ds:schemaRef ds:uri="http://purl.org/dc/elements/1.1/"/>
+    <ds:schemaRef ds:uri="http://schemas.microsoft.com/office/infopath/2007/PartnerControls"/>
     <ds:schemaRef ds:uri="http://schemas.microsoft.com/office/2006/metadata/properties"/>
-    <ds:schemaRef ds:uri="http://schemas.microsoft.com/office/infopath/2007/PartnerControls"/>
-    <ds:schemaRef ds:uri="http://schemas.openxmlformats.org/package/2006/metadata/core-properties"/>
+    <ds:schemaRef ds:uri="fe73b3f6-a427-4a99-886e-da32c6de835d"/>
     <ds:schemaRef ds:uri="http://purl.org/dc/terms/"/>
-    <ds:schemaRef ds:uri="fe73b3f6-a427-4a99-886e-da32c6de835d"/>
-    <ds:schemaRef ds:uri="aa219290-eb03-4a97-b130-2294a785c327"/>
-    <ds:schemaRef ds:uri="4240f11c-4df2-4a37-9be1-bdf0d4dfc218"/>
     <ds:schemaRef ds:uri="http://www.w3.org/XML/1998/namespace"/>
     <ds:schemaRef ds:uri="http://purl.org/dc/dcmitype/"/>
   </ds:schemaRefs>
@@ -3336,14 +3336,22 @@
 </file>
 
 <file path=customXml/itemProps3.xml><?xml version="1.0" encoding="utf-8"?>
-<ds:datastoreItem xmlns:ds="http://schemas.openxmlformats.org/officeDocument/2006/customXml" ds:itemID="{0E485EC4-498C-4950-880B-710CFB50DAA5}">
+<ds:datastoreItem xmlns:ds="http://schemas.openxmlformats.org/officeDocument/2006/customXml" ds:itemID="{FD5C724A-FE52-47CB-B70E-6E5E629AB91F}">
   <ds:schemaRefs>
-    <ds:schemaRef ds:uri="Microsoft.SharePoint.Taxonomy.ContentTypeSync"/>
+    <ds:schemaRef ds:uri="http://schemas.microsoft.com/sharepoint/events"/>
   </ds:schemaRefs>
 </ds:datastoreItem>
 </file>
 
 <file path=customXml/itemProps4.xml><?xml version="1.0" encoding="utf-8"?>
+<ds:datastoreItem xmlns:ds="http://schemas.openxmlformats.org/officeDocument/2006/customXml" ds:itemID="{7DB827CD-1950-4443-8028-9F1C4B24F5FF}">
+  <ds:schemaRefs>
+    <ds:schemaRef ds:uri="http://schemas.microsoft.com/sharepoint/v3/contenttype/forms"/>
+  </ds:schemaRefs>
+</ds:datastoreItem>
+</file>
+
+<file path=customXml/itemProps5.xml><?xml version="1.0" encoding="utf-8"?>
 <ds:datastoreItem xmlns:ds="http://schemas.openxmlformats.org/officeDocument/2006/customXml" ds:itemID="{47F328B5-8F28-44B4-AEDA-892F7390405F}">
   <ds:schemaRefs>
     <ds:schemaRef ds:uri="http://schemas.microsoft.com/office/2006/metadata/contentType"/>
@@ -3363,14 +3371,6 @@
 </ds:datastoreItem>
 </file>
 
-<file path=customXml/itemProps5.xml><?xml version="1.0" encoding="utf-8"?>
-<ds:datastoreItem xmlns:ds="http://schemas.openxmlformats.org/officeDocument/2006/customXml" ds:itemID="{7DB827CD-1950-4443-8028-9F1C4B24F5FF}">
-  <ds:schemaRefs>
-    <ds:schemaRef ds:uri="http://schemas.microsoft.com/sharepoint/v3/contenttype/forms"/>
-  </ds:schemaRefs>
-</ds:datastoreItem>
-</file>
-
 <file path=docMetadata/LabelInfo.xml><?xml version="1.0" encoding="utf-8"?>
 <clbl:labelList xmlns:clbl="http://schemas.microsoft.com/office/2020/mipLabelMetadata">
   <clbl:label id="{5d6aa37e-3a89-4bd8-9367-95b8219209ae}" enabled="1" method="Standard" siteId="{6ad73702-409c-4046-ae59-cc4bea334507}" contentBits="1" removed="0"/>

</xml_diff>